<commit_message>
Change the log in scene
</commit_message>
<xml_diff>
--- a/backup-database-doc-mdj/System diagram.pptx
+++ b/backup-database-doc-mdj/System diagram.pptx
@@ -6,6 +6,7 @@
   </p:sldMasterIdLst>
   <p:sldIdLst>
     <p:sldId id="256" r:id="rId2"/>
+    <p:sldId id="257" r:id="rId3"/>
   </p:sldIdLst>
   <p:sldSz cx="12192000" cy="6858000"/>
   <p:notesSz cx="6858000" cy="9144000"/>
@@ -163,7 +164,7 @@
           <a:p>
             <a:fld id="{E69B9EE9-F3BF-4B40-83E7-C9BC68FDDB0E}" type="datetimeFigureOut">
               <a:rPr lang="en-US" smtClean="0"/>
-              <a:t>02-May-22</a:t>
+              <a:t>5/17/2022</a:t>
             </a:fld>
             <a:endParaRPr lang="en-US"/>
           </a:p>
@@ -316,7 +317,7 @@
           <a:p>
             <a:fld id="{E69B9EE9-F3BF-4B40-83E7-C9BC68FDDB0E}" type="datetimeFigureOut">
               <a:rPr lang="en-US" smtClean="0"/>
-              <a:t>02-May-22</a:t>
+              <a:t>5/17/2022</a:t>
             </a:fld>
             <a:endParaRPr lang="en-US"/>
           </a:p>
@@ -548,7 +549,7 @@
           <a:p>
             <a:fld id="{E69B9EE9-F3BF-4B40-83E7-C9BC68FDDB0E}" type="datetimeFigureOut">
               <a:rPr lang="en-US" smtClean="0"/>
-              <a:t>02-May-22</a:t>
+              <a:t>5/17/2022</a:t>
             </a:fld>
             <a:endParaRPr lang="en-US"/>
           </a:p>
@@ -851,7 +852,7 @@
           <a:p>
             <a:fld id="{E69B9EE9-F3BF-4B40-83E7-C9BC68FDDB0E}" type="datetimeFigureOut">
               <a:rPr lang="en-US" smtClean="0"/>
-              <a:t>02-May-22</a:t>
+              <a:t>5/17/2022</a:t>
             </a:fld>
             <a:endParaRPr lang="en-US"/>
           </a:p>
@@ -1061,7 +1062,7 @@
           <a:p>
             <a:fld id="{E69B9EE9-F3BF-4B40-83E7-C9BC68FDDB0E}" type="datetimeFigureOut">
               <a:rPr lang="en-US" smtClean="0"/>
-              <a:t>02-May-22</a:t>
+              <a:t>5/17/2022</a:t>
             </a:fld>
             <a:endParaRPr lang="en-US"/>
           </a:p>
@@ -1354,7 +1355,7 @@
           <a:p>
             <a:fld id="{E69B9EE9-F3BF-4B40-83E7-C9BC68FDDB0E}" type="datetimeFigureOut">
               <a:rPr lang="en-US" smtClean="0"/>
-              <a:t>02-May-22</a:t>
+              <a:t>5/17/2022</a:t>
             </a:fld>
             <a:endParaRPr lang="en-US"/>
           </a:p>
@@ -2941,7 +2942,7 @@
         </p:nvSpPr>
         <p:spPr>
           <a:xfrm>
-            <a:off x="2286000" y="778811"/>
+            <a:off x="1774550" y="1308849"/>
             <a:ext cx="2359300" cy="1060076"/>
           </a:xfrm>
           <a:prstGeom prst="rect">
@@ -2976,7 +2977,7 @@
           <a:p>
             <a:pPr algn="ctr"/>
             <a:r>
-              <a:rPr lang="en-US">
+              <a:rPr lang="en-US" dirty="0">
                 <a:solidFill>
                   <a:sysClr val="windowText" lastClr="000000"/>
                 </a:solidFill>
@@ -2987,12 +2988,12 @@
           <a:p>
             <a:pPr algn="ctr"/>
             <a:r>
-              <a:rPr lang="en-US">
+              <a:rPr lang="en-US" dirty="0">
                 <a:solidFill>
                   <a:sysClr val="windowText" lastClr="000000"/>
                 </a:solidFill>
               </a:rPr>
-              <a:t>User record system</a:t>
+              <a:t>Database system</a:t>
             </a:r>
           </a:p>
         </p:txBody>
@@ -3081,7 +3082,7 @@
         </p:nvSpPr>
         <p:spPr>
           <a:xfrm>
-            <a:off x="8305800" y="5019114"/>
+            <a:off x="8058152" y="4489078"/>
             <a:ext cx="2095500" cy="1060076"/>
           </a:xfrm>
           <a:prstGeom prst="rect">
@@ -3116,7 +3117,7 @@
           <a:p>
             <a:pPr algn="ctr"/>
             <a:r>
-              <a:rPr lang="en-US">
+              <a:rPr lang="en-US" dirty="0">
                 <a:solidFill>
                   <a:sysClr val="windowText" lastClr="000000"/>
                 </a:solidFill>
@@ -3127,12 +3128,12 @@
           <a:p>
             <a:pPr algn="ctr"/>
             <a:r>
-              <a:rPr lang="en-US">
+              <a:rPr lang="en-US" dirty="0">
                 <a:solidFill>
                   <a:sysClr val="windowText" lastClr="000000"/>
                 </a:solidFill>
               </a:rPr>
-              <a:t>Addmissions system</a:t>
+              <a:t>Order processing system</a:t>
             </a:r>
           </a:p>
         </p:txBody>
@@ -3151,7 +3152,7 @@
         </p:nvSpPr>
         <p:spPr>
           <a:xfrm>
-            <a:off x="8305800" y="778811"/>
+            <a:off x="8058152" y="1308847"/>
             <a:ext cx="2095500" cy="1060076"/>
           </a:xfrm>
           <a:prstGeom prst="rect">
@@ -3186,7 +3187,7 @@
           <a:p>
             <a:pPr algn="ctr"/>
             <a:r>
-              <a:rPr lang="en-US">
+              <a:rPr lang="en-US" dirty="0">
                 <a:solidFill>
                   <a:sysClr val="windowText" lastClr="000000"/>
                 </a:solidFill>
@@ -3197,12 +3198,12 @@
           <a:p>
             <a:pPr algn="ctr"/>
             <a:r>
-              <a:rPr lang="en-US">
+              <a:rPr lang="en-US" dirty="0">
                 <a:solidFill>
                   <a:sysClr val="windowText" lastClr="000000"/>
                 </a:solidFill>
               </a:rPr>
-              <a:t>Order system</a:t>
+              <a:t>Request processing system</a:t>
             </a:r>
           </a:p>
         </p:txBody>
@@ -3221,7 +3222,7 @@
         </p:nvSpPr>
         <p:spPr>
           <a:xfrm>
-            <a:off x="2283107" y="5019114"/>
+            <a:off x="1771656" y="4489076"/>
             <a:ext cx="2362193" cy="1060076"/>
           </a:xfrm>
           <a:prstGeom prst="rect">
@@ -3256,7 +3257,7 @@
           <a:p>
             <a:pPr algn="ctr"/>
             <a:r>
-              <a:rPr lang="en-US">
+              <a:rPr lang="en-US" dirty="0">
                 <a:solidFill>
                   <a:sysClr val="windowText" lastClr="000000"/>
                 </a:solidFill>
@@ -3267,23 +3268,12 @@
           <a:p>
             <a:pPr algn="ctr"/>
             <a:r>
-              <a:rPr lang="vi-VN">
+              <a:rPr lang="en-US" dirty="0">
                 <a:solidFill>
                   <a:sysClr val="windowText" lastClr="000000"/>
                 </a:solidFill>
               </a:rPr>
-              <a:t>Reviewing &amp; Rating</a:t>
-            </a:r>
-          </a:p>
-          <a:p>
-            <a:pPr algn="ctr"/>
-            <a:r>
-              <a:rPr lang="en-US">
-                <a:solidFill>
-                  <a:sysClr val="windowText" lastClr="000000"/>
-                </a:solidFill>
-              </a:rPr>
-              <a:t>management system</a:t>
+              <a:t>User interface</a:t>
             </a:r>
           </a:p>
         </p:txBody>
@@ -3299,15 +3289,14 @@
           </p:cNvPr>
           <p:cNvCxnSpPr>
             <a:cxnSpLocks/>
-            <a:stCxn id="4" idx="0"/>
-            <a:endCxn id="2" idx="2"/>
+            <a:endCxn id="2" idx="3"/>
           </p:cNvCxnSpPr>
           <p:nvPr/>
         </p:nvCxnSpPr>
         <p:spPr>
           <a:xfrm flipH="1" flipV="1">
-            <a:off x="3465650" y="1838887"/>
-            <a:ext cx="2630350" cy="1060075"/>
+            <a:off x="4133850" y="1838887"/>
+            <a:ext cx="914399" cy="1060075"/>
           </a:xfrm>
           <a:prstGeom prst="line">
             <a:avLst/>
@@ -3344,15 +3333,14 @@
           </p:cNvPr>
           <p:cNvCxnSpPr>
             <a:cxnSpLocks/>
-            <a:stCxn id="4" idx="1"/>
             <a:endCxn id="8" idx="3"/>
           </p:cNvCxnSpPr>
           <p:nvPr/>
         </p:nvCxnSpPr>
         <p:spPr>
           <a:xfrm flipH="1">
-            <a:off x="4645300" y="3429000"/>
-            <a:ext cx="402950" cy="2120152"/>
+            <a:off x="4133849" y="3959038"/>
+            <a:ext cx="914400" cy="1060076"/>
           </a:xfrm>
           <a:prstGeom prst="line">
             <a:avLst/>
@@ -3389,15 +3377,14 @@
           </p:cNvPr>
           <p:cNvCxnSpPr>
             <a:cxnSpLocks/>
-            <a:stCxn id="6" idx="0"/>
-            <a:endCxn id="4" idx="2"/>
+            <a:endCxn id="6" idx="1"/>
           </p:cNvCxnSpPr>
           <p:nvPr/>
         </p:nvCxnSpPr>
         <p:spPr>
-          <a:xfrm flipH="1" flipV="1">
-            <a:off x="6096000" y="3959038"/>
-            <a:ext cx="3257550" cy="1060076"/>
+          <a:xfrm>
+            <a:off x="7143750" y="3959037"/>
+            <a:ext cx="914402" cy="1060079"/>
           </a:xfrm>
           <a:prstGeom prst="line">
             <a:avLst/>
@@ -3435,14 +3422,13 @@
           <p:cNvCxnSpPr>
             <a:cxnSpLocks/>
             <a:stCxn id="7" idx="1"/>
-            <a:endCxn id="4" idx="3"/>
           </p:cNvCxnSpPr>
           <p:nvPr/>
         </p:nvCxnSpPr>
         <p:spPr>
           <a:xfrm flipH="1">
-            <a:off x="7143750" y="1308849"/>
-            <a:ext cx="1162050" cy="2120151"/>
+            <a:off x="7143750" y="1838885"/>
+            <a:ext cx="914402" cy="1060077"/>
           </a:xfrm>
           <a:prstGeom prst="line">
             <a:avLst/>
@@ -3481,6 +3467,863 @@
   <p:transition>
     <p:fade/>
   </p:transition>
+</p:sld>
+</file>
+
+<file path=ppt/slides/slide2.xml><?xml version="1.0" encoding="utf-8"?>
+<p:sld xmlns:a="http://schemas.openxmlformats.org/drawingml/2006/main" xmlns:r="http://schemas.openxmlformats.org/officeDocument/2006/relationships" xmlns:p="http://schemas.openxmlformats.org/presentationml/2006/main">
+  <p:cSld>
+    <p:spTree>
+      <p:nvGrpSpPr>
+        <p:cNvPr id="1" name=""/>
+        <p:cNvGrpSpPr/>
+        <p:nvPr/>
+      </p:nvGrpSpPr>
+      <p:grpSpPr>
+        <a:xfrm>
+          <a:off x="0" y="0"/>
+          <a:ext cx="0" cy="0"/>
+          <a:chOff x="0" y="0"/>
+          <a:chExt cx="0" cy="0"/>
+        </a:xfrm>
+      </p:grpSpPr>
+      <p:grpSp>
+        <p:nvGrpSpPr>
+          <p:cNvPr id="55" name="Group 54">
+            <a:extLst>
+              <a:ext uri="{FF2B5EF4-FFF2-40B4-BE49-F238E27FC236}">
+                <a16:creationId xmlns:a16="http://schemas.microsoft.com/office/drawing/2014/main" id="{36AB900A-2627-DD79-D6A7-094F6F5508DF}"/>
+              </a:ext>
+            </a:extLst>
+          </p:cNvPr>
+          <p:cNvGrpSpPr/>
+          <p:nvPr/>
+        </p:nvGrpSpPr>
+        <p:grpSpPr>
+          <a:xfrm>
+            <a:off x="1447800" y="1752600"/>
+            <a:ext cx="8919210" cy="1063671"/>
+            <a:chOff x="1443990" y="1744980"/>
+            <a:chExt cx="8919210" cy="737315"/>
+          </a:xfrm>
+        </p:grpSpPr>
+        <p:sp>
+          <p:nvSpPr>
+            <p:cNvPr id="3" name="Rectangle 2">
+              <a:extLst>
+                <a:ext uri="{FF2B5EF4-FFF2-40B4-BE49-F238E27FC236}">
+                  <a16:creationId xmlns:a16="http://schemas.microsoft.com/office/drawing/2014/main" id="{CB8974FA-F90D-4716-68AF-61C0C43C7F2A}"/>
+                </a:ext>
+              </a:extLst>
+            </p:cNvPr>
+            <p:cNvSpPr/>
+            <p:nvPr/>
+          </p:nvSpPr>
+          <p:spPr>
+            <a:xfrm>
+              <a:off x="1443990" y="1750775"/>
+              <a:ext cx="1828800" cy="731520"/>
+            </a:xfrm>
+            <a:prstGeom prst="rect">
+              <a:avLst/>
+            </a:prstGeom>
+            <a:noFill/>
+            <a:ln w="28575">
+              <a:solidFill>
+                <a:srgbClr val="00B0F0"/>
+              </a:solidFill>
+            </a:ln>
+          </p:spPr>
+          <p:style>
+            <a:lnRef idx="2">
+              <a:schemeClr val="accent1">
+                <a:shade val="50000"/>
+              </a:schemeClr>
+            </a:lnRef>
+            <a:fillRef idx="1">
+              <a:schemeClr val="accent1"/>
+            </a:fillRef>
+            <a:effectRef idx="0">
+              <a:schemeClr val="accent1"/>
+            </a:effectRef>
+            <a:fontRef idx="minor">
+              <a:schemeClr val="lt1"/>
+            </a:fontRef>
+          </p:style>
+          <p:txBody>
+            <a:bodyPr rtlCol="0" anchor="ctr"/>
+            <a:lstStyle/>
+            <a:p>
+              <a:pPr algn="ctr"/>
+              <a:r>
+                <a:rPr lang="en-US" sz="1600" dirty="0">
+                  <a:solidFill>
+                    <a:sysClr val="windowText" lastClr="000000"/>
+                  </a:solidFill>
+                </a:rPr>
+                <a:t>Customer</a:t>
+              </a:r>
+            </a:p>
+          </p:txBody>
+        </p:sp>
+        <p:sp>
+          <p:nvSpPr>
+            <p:cNvPr id="4" name="Rectangle 3">
+              <a:extLst>
+                <a:ext uri="{FF2B5EF4-FFF2-40B4-BE49-F238E27FC236}">
+                  <a16:creationId xmlns:a16="http://schemas.microsoft.com/office/drawing/2014/main" id="{CF7BA50B-906A-242E-7CA9-7A726108C49C}"/>
+                </a:ext>
+              </a:extLst>
+            </p:cNvPr>
+            <p:cNvSpPr/>
+            <p:nvPr/>
+          </p:nvSpPr>
+          <p:spPr>
+            <a:xfrm>
+              <a:off x="8534400" y="1744980"/>
+              <a:ext cx="1828800" cy="731520"/>
+            </a:xfrm>
+            <a:prstGeom prst="rect">
+              <a:avLst/>
+            </a:prstGeom>
+            <a:noFill/>
+            <a:ln w="28575">
+              <a:solidFill>
+                <a:srgbClr val="00B0F0"/>
+              </a:solidFill>
+            </a:ln>
+          </p:spPr>
+          <p:style>
+            <a:lnRef idx="2">
+              <a:schemeClr val="accent1">
+                <a:shade val="50000"/>
+              </a:schemeClr>
+            </a:lnRef>
+            <a:fillRef idx="1">
+              <a:schemeClr val="accent1"/>
+            </a:fillRef>
+            <a:effectRef idx="0">
+              <a:schemeClr val="accent1"/>
+            </a:effectRef>
+            <a:fontRef idx="minor">
+              <a:schemeClr val="lt1"/>
+            </a:fontRef>
+          </p:style>
+          <p:txBody>
+            <a:bodyPr rtlCol="0" anchor="ctr"/>
+            <a:lstStyle/>
+            <a:p>
+              <a:pPr algn="ctr"/>
+              <a:r>
+                <a:rPr lang="en-US" sz="1600" dirty="0">
+                  <a:solidFill>
+                    <a:sysClr val="windowText" lastClr="000000"/>
+                  </a:solidFill>
+                </a:rPr>
+                <a:t>Administrator</a:t>
+              </a:r>
+            </a:p>
+          </p:txBody>
+        </p:sp>
+        <p:sp>
+          <p:nvSpPr>
+            <p:cNvPr id="16" name="Rectangle: Rounded Corners 15">
+              <a:extLst>
+                <a:ext uri="{FF2B5EF4-FFF2-40B4-BE49-F238E27FC236}">
+                  <a16:creationId xmlns:a16="http://schemas.microsoft.com/office/drawing/2014/main" id="{306AB30F-A9B1-4A7D-DEBB-B24D93AE441E}"/>
+                </a:ext>
+              </a:extLst>
+            </p:cNvPr>
+            <p:cNvSpPr/>
+            <p:nvPr/>
+          </p:nvSpPr>
+          <p:spPr>
+            <a:xfrm>
+              <a:off x="5257800" y="1744980"/>
+              <a:ext cx="1295400" cy="731520"/>
+            </a:xfrm>
+            <a:prstGeom prst="roundRect">
+              <a:avLst>
+                <a:gd name="adj" fmla="val 50000"/>
+              </a:avLst>
+            </a:prstGeom>
+            <a:noFill/>
+            <a:ln w="28575">
+              <a:solidFill>
+                <a:srgbClr val="00B0F0"/>
+              </a:solidFill>
+            </a:ln>
+          </p:spPr>
+          <p:style>
+            <a:lnRef idx="2">
+              <a:schemeClr val="accent1">
+                <a:shade val="50000"/>
+              </a:schemeClr>
+            </a:lnRef>
+            <a:fillRef idx="1">
+              <a:schemeClr val="accent1"/>
+            </a:fillRef>
+            <a:effectRef idx="0">
+              <a:schemeClr val="accent1"/>
+            </a:effectRef>
+            <a:fontRef idx="minor">
+              <a:schemeClr val="lt1"/>
+            </a:fontRef>
+          </p:style>
+          <p:txBody>
+            <a:bodyPr rtlCol="0" anchor="ctr"/>
+            <a:lstStyle/>
+            <a:p>
+              <a:pPr algn="ctr"/>
+              <a:r>
+                <a:rPr lang="en-US" sz="1600" dirty="0" err="1">
+                  <a:solidFill>
+                    <a:sysClr val="windowText" lastClr="000000"/>
+                  </a:solidFill>
+                </a:rPr>
+                <a:t>Bookbyte</a:t>
+              </a:r>
+              <a:endParaRPr lang="en-US" sz="1600" dirty="0">
+                <a:solidFill>
+                  <a:sysClr val="windowText" lastClr="000000"/>
+                </a:solidFill>
+              </a:endParaRPr>
+            </a:p>
+          </p:txBody>
+        </p:sp>
+        <p:grpSp>
+          <p:nvGrpSpPr>
+            <p:cNvPr id="9" name="Group 8">
+              <a:extLst>
+                <a:ext uri="{FF2B5EF4-FFF2-40B4-BE49-F238E27FC236}">
+                  <a16:creationId xmlns:a16="http://schemas.microsoft.com/office/drawing/2014/main" id="{497266B0-CAF3-0849-F2DF-4E630D18ECE7}"/>
+                </a:ext>
+              </a:extLst>
+            </p:cNvPr>
+            <p:cNvGrpSpPr/>
+            <p:nvPr/>
+          </p:nvGrpSpPr>
+          <p:grpSpPr>
+            <a:xfrm>
+              <a:off x="3272790" y="1976899"/>
+              <a:ext cx="1985010" cy="139636"/>
+              <a:chOff x="3272790" y="1986344"/>
+              <a:chExt cx="1985010" cy="139636"/>
+            </a:xfrm>
+          </p:grpSpPr>
+          <p:cxnSp>
+            <p:nvCxnSpPr>
+              <p:cNvPr id="7" name="Straight Arrow Connector 6">
+                <a:extLst>
+                  <a:ext uri="{FF2B5EF4-FFF2-40B4-BE49-F238E27FC236}">
+                    <a16:creationId xmlns:a16="http://schemas.microsoft.com/office/drawing/2014/main" id="{F9C4B797-4561-B790-426F-FD456D44445F}"/>
+                  </a:ext>
+                </a:extLst>
+              </p:cNvPr>
+              <p:cNvCxnSpPr>
+                <a:cxnSpLocks/>
+                <a:stCxn id="3" idx="3"/>
+                <a:endCxn id="16" idx="1"/>
+              </p:cNvCxnSpPr>
+              <p:nvPr/>
+            </p:nvCxnSpPr>
+            <p:spPr>
+              <a:xfrm flipV="1">
+                <a:off x="3272790" y="2120185"/>
+                <a:ext cx="1985010" cy="5795"/>
+              </a:xfrm>
+              <a:prstGeom prst="straightConnector1">
+                <a:avLst/>
+              </a:prstGeom>
+              <a:ln w="28575">
+                <a:solidFill>
+                  <a:schemeClr val="tx1"/>
+                </a:solidFill>
+                <a:tailEnd type="triangle"/>
+              </a:ln>
+            </p:spPr>
+            <p:style>
+              <a:lnRef idx="1">
+                <a:schemeClr val="accent1"/>
+              </a:lnRef>
+              <a:fillRef idx="0">
+                <a:schemeClr val="accent1"/>
+              </a:fillRef>
+              <a:effectRef idx="0">
+                <a:schemeClr val="accent1"/>
+              </a:effectRef>
+              <a:fontRef idx="minor">
+                <a:schemeClr val="tx1"/>
+              </a:fontRef>
+            </p:style>
+          </p:cxnSp>
+          <p:sp>
+            <p:nvSpPr>
+              <p:cNvPr id="8" name="TextBox 7">
+                <a:extLst>
+                  <a:ext uri="{FF2B5EF4-FFF2-40B4-BE49-F238E27FC236}">
+                    <a16:creationId xmlns:a16="http://schemas.microsoft.com/office/drawing/2014/main" id="{D7C5D83D-FDF9-EE57-DA35-737D85BA90CD}"/>
+                  </a:ext>
+                </a:extLst>
+              </p:cNvPr>
+              <p:cNvSpPr txBox="1"/>
+              <p:nvPr/>
+            </p:nvSpPr>
+            <p:spPr>
+              <a:xfrm>
+                <a:off x="3390900" y="1986344"/>
+                <a:ext cx="1562100" cy="128007"/>
+              </a:xfrm>
+              <a:prstGeom prst="rect">
+                <a:avLst/>
+              </a:prstGeom>
+              <a:noFill/>
+            </p:spPr>
+            <p:txBody>
+              <a:bodyPr wrap="square" lIns="0" tIns="0" rIns="0" bIns="0" rtlCol="0">
+                <a:spAutoFit/>
+              </a:bodyPr>
+              <a:lstStyle/>
+              <a:p>
+                <a:pPr algn="l"/>
+                <a:r>
+                  <a:rPr lang="en-US" sz="1200" dirty="0"/>
+                  <a:t>Customer info</a:t>
+                </a:r>
+              </a:p>
+            </p:txBody>
+          </p:sp>
+        </p:grpSp>
+        <p:grpSp>
+          <p:nvGrpSpPr>
+            <p:cNvPr id="10" name="Group 9">
+              <a:extLst>
+                <a:ext uri="{FF2B5EF4-FFF2-40B4-BE49-F238E27FC236}">
+                  <a16:creationId xmlns:a16="http://schemas.microsoft.com/office/drawing/2014/main" id="{00622E76-31FC-E614-F8BD-5BC0A1E5C96B}"/>
+                </a:ext>
+              </a:extLst>
+            </p:cNvPr>
+            <p:cNvGrpSpPr/>
+            <p:nvPr/>
+          </p:nvGrpSpPr>
+          <p:grpSpPr>
+            <a:xfrm>
+              <a:off x="3272790" y="2182278"/>
+              <a:ext cx="2046605" cy="128007"/>
+              <a:chOff x="3211195" y="2006222"/>
+              <a:chExt cx="2046605" cy="128007"/>
+            </a:xfrm>
+          </p:grpSpPr>
+          <p:cxnSp>
+            <p:nvCxnSpPr>
+              <p:cNvPr id="11" name="Straight Arrow Connector 10">
+                <a:extLst>
+                  <a:ext uri="{FF2B5EF4-FFF2-40B4-BE49-F238E27FC236}">
+                    <a16:creationId xmlns:a16="http://schemas.microsoft.com/office/drawing/2014/main" id="{2F5A72F0-0D19-1164-9061-8B03C4496BCE}"/>
+                  </a:ext>
+                </a:extLst>
+              </p:cNvPr>
+              <p:cNvCxnSpPr>
+                <a:cxnSpLocks/>
+              </p:cNvCxnSpPr>
+              <p:nvPr/>
+            </p:nvCxnSpPr>
+            <p:spPr>
+              <a:xfrm>
+                <a:off x="3211195" y="2133600"/>
+                <a:ext cx="2046605" cy="0"/>
+              </a:xfrm>
+              <a:prstGeom prst="straightConnector1">
+                <a:avLst/>
+              </a:prstGeom>
+              <a:ln w="28575">
+                <a:solidFill>
+                  <a:schemeClr val="tx1"/>
+                </a:solidFill>
+                <a:tailEnd type="triangle"/>
+              </a:ln>
+            </p:spPr>
+            <p:style>
+              <a:lnRef idx="1">
+                <a:schemeClr val="accent1"/>
+              </a:lnRef>
+              <a:fillRef idx="0">
+                <a:schemeClr val="accent1"/>
+              </a:fillRef>
+              <a:effectRef idx="0">
+                <a:schemeClr val="accent1"/>
+              </a:effectRef>
+              <a:fontRef idx="minor">
+                <a:schemeClr val="tx1"/>
+              </a:fontRef>
+            </p:style>
+          </p:cxnSp>
+          <p:sp>
+            <p:nvSpPr>
+              <p:cNvPr id="12" name="TextBox 11">
+                <a:extLst>
+                  <a:ext uri="{FF2B5EF4-FFF2-40B4-BE49-F238E27FC236}">
+                    <a16:creationId xmlns:a16="http://schemas.microsoft.com/office/drawing/2014/main" id="{64A84666-C84E-4016-1732-D9DF644BDAF3}"/>
+                  </a:ext>
+                </a:extLst>
+              </p:cNvPr>
+              <p:cNvSpPr txBox="1"/>
+              <p:nvPr/>
+            </p:nvSpPr>
+            <p:spPr>
+              <a:xfrm>
+                <a:off x="3329305" y="2006222"/>
+                <a:ext cx="1562100" cy="128007"/>
+              </a:xfrm>
+              <a:prstGeom prst="rect">
+                <a:avLst/>
+              </a:prstGeom>
+              <a:noFill/>
+            </p:spPr>
+            <p:txBody>
+              <a:bodyPr wrap="square" lIns="0" tIns="0" rIns="0" bIns="0" rtlCol="0">
+                <a:spAutoFit/>
+              </a:bodyPr>
+              <a:lstStyle/>
+              <a:p>
+                <a:pPr algn="l"/>
+                <a:r>
+                  <a:rPr lang="en-US" sz="1200" dirty="0"/>
+                  <a:t>Order info</a:t>
+                </a:r>
+              </a:p>
+            </p:txBody>
+          </p:sp>
+        </p:grpSp>
+        <p:grpSp>
+          <p:nvGrpSpPr>
+            <p:cNvPr id="13" name="Group 12">
+              <a:extLst>
+                <a:ext uri="{FF2B5EF4-FFF2-40B4-BE49-F238E27FC236}">
+                  <a16:creationId xmlns:a16="http://schemas.microsoft.com/office/drawing/2014/main" id="{2B8CD28A-B3E2-8FC1-9DCF-4391EF78E808}"/>
+                </a:ext>
+              </a:extLst>
+            </p:cNvPr>
+            <p:cNvGrpSpPr/>
+            <p:nvPr/>
+          </p:nvGrpSpPr>
+          <p:grpSpPr>
+            <a:xfrm>
+              <a:off x="6553200" y="1975008"/>
+              <a:ext cx="2358390" cy="135732"/>
+              <a:chOff x="2819400" y="1990248"/>
+              <a:chExt cx="2358390" cy="135732"/>
+            </a:xfrm>
+          </p:grpSpPr>
+          <p:cxnSp>
+            <p:nvCxnSpPr>
+              <p:cNvPr id="14" name="Straight Arrow Connector 13">
+                <a:extLst>
+                  <a:ext uri="{FF2B5EF4-FFF2-40B4-BE49-F238E27FC236}">
+                    <a16:creationId xmlns:a16="http://schemas.microsoft.com/office/drawing/2014/main" id="{69478DF3-F9CC-3D8D-B601-C5936B489972}"/>
+                  </a:ext>
+                </a:extLst>
+              </p:cNvPr>
+              <p:cNvCxnSpPr>
+                <a:cxnSpLocks/>
+                <a:stCxn id="4" idx="1"/>
+                <a:endCxn id="16" idx="3"/>
+              </p:cNvCxnSpPr>
+              <p:nvPr/>
+            </p:nvCxnSpPr>
+            <p:spPr>
+              <a:xfrm flipH="1">
+                <a:off x="2819400" y="2125980"/>
+                <a:ext cx="1981200" cy="0"/>
+              </a:xfrm>
+              <a:prstGeom prst="straightConnector1">
+                <a:avLst/>
+              </a:prstGeom>
+              <a:ln w="28575">
+                <a:solidFill>
+                  <a:schemeClr val="tx1"/>
+                </a:solidFill>
+                <a:tailEnd type="triangle"/>
+              </a:ln>
+            </p:spPr>
+            <p:style>
+              <a:lnRef idx="1">
+                <a:schemeClr val="accent1"/>
+              </a:lnRef>
+              <a:fillRef idx="0">
+                <a:schemeClr val="accent1"/>
+              </a:fillRef>
+              <a:effectRef idx="0">
+                <a:schemeClr val="accent1"/>
+              </a:effectRef>
+              <a:fontRef idx="minor">
+                <a:schemeClr val="tx1"/>
+              </a:fontRef>
+            </p:style>
+          </p:cxnSp>
+          <p:sp>
+            <p:nvSpPr>
+              <p:cNvPr id="15" name="TextBox 14">
+                <a:extLst>
+                  <a:ext uri="{FF2B5EF4-FFF2-40B4-BE49-F238E27FC236}">
+                    <a16:creationId xmlns:a16="http://schemas.microsoft.com/office/drawing/2014/main" id="{507DC28C-D863-7484-4625-AFE8EC66EB3A}"/>
+                  </a:ext>
+                </a:extLst>
+              </p:cNvPr>
+              <p:cNvSpPr txBox="1"/>
+              <p:nvPr/>
+            </p:nvSpPr>
+            <p:spPr>
+              <a:xfrm>
+                <a:off x="4034790" y="1990248"/>
+                <a:ext cx="1143000" cy="128007"/>
+              </a:xfrm>
+              <a:prstGeom prst="rect">
+                <a:avLst/>
+              </a:prstGeom>
+              <a:noFill/>
+            </p:spPr>
+            <p:txBody>
+              <a:bodyPr wrap="square" lIns="0" tIns="0" rIns="0" bIns="0" rtlCol="0">
+                <a:spAutoFit/>
+              </a:bodyPr>
+              <a:lstStyle/>
+              <a:p>
+                <a:pPr algn="l"/>
+                <a:r>
+                  <a:rPr lang="en-US" sz="1200" dirty="0"/>
+                  <a:t>Book info </a:t>
+                </a:r>
+              </a:p>
+            </p:txBody>
+          </p:sp>
+        </p:grpSp>
+        <p:grpSp>
+          <p:nvGrpSpPr>
+            <p:cNvPr id="17" name="Group 16">
+              <a:extLst>
+                <a:ext uri="{FF2B5EF4-FFF2-40B4-BE49-F238E27FC236}">
+                  <a16:creationId xmlns:a16="http://schemas.microsoft.com/office/drawing/2014/main" id="{3BEBE35D-F144-BD4E-FABE-8FFEC0069E9F}"/>
+                </a:ext>
+              </a:extLst>
+            </p:cNvPr>
+            <p:cNvGrpSpPr/>
+            <p:nvPr/>
+          </p:nvGrpSpPr>
+          <p:grpSpPr>
+            <a:xfrm>
+              <a:off x="6477000" y="2182277"/>
+              <a:ext cx="2209165" cy="128007"/>
+              <a:chOff x="2743200" y="2004317"/>
+              <a:chExt cx="2209165" cy="128007"/>
+            </a:xfrm>
+          </p:grpSpPr>
+          <p:cxnSp>
+            <p:nvCxnSpPr>
+              <p:cNvPr id="18" name="Straight Arrow Connector 17">
+                <a:extLst>
+                  <a:ext uri="{FF2B5EF4-FFF2-40B4-BE49-F238E27FC236}">
+                    <a16:creationId xmlns:a16="http://schemas.microsoft.com/office/drawing/2014/main" id="{E99C5A76-7D11-B3CA-4C62-21794DD635A7}"/>
+                  </a:ext>
+                </a:extLst>
+              </p:cNvPr>
+              <p:cNvCxnSpPr>
+                <a:cxnSpLocks/>
+              </p:cNvCxnSpPr>
+              <p:nvPr/>
+            </p:nvCxnSpPr>
+            <p:spPr>
+              <a:xfrm>
+                <a:off x="2743200" y="2131696"/>
+                <a:ext cx="2057400" cy="0"/>
+              </a:xfrm>
+              <a:prstGeom prst="straightConnector1">
+                <a:avLst/>
+              </a:prstGeom>
+              <a:ln w="28575">
+                <a:solidFill>
+                  <a:schemeClr val="tx1"/>
+                </a:solidFill>
+                <a:tailEnd type="triangle"/>
+              </a:ln>
+            </p:spPr>
+            <p:style>
+              <a:lnRef idx="1">
+                <a:schemeClr val="accent1"/>
+              </a:lnRef>
+              <a:fillRef idx="0">
+                <a:schemeClr val="accent1"/>
+              </a:fillRef>
+              <a:effectRef idx="0">
+                <a:schemeClr val="accent1"/>
+              </a:effectRef>
+              <a:fontRef idx="minor">
+                <a:schemeClr val="tx1"/>
+              </a:fontRef>
+            </p:style>
+          </p:cxnSp>
+          <p:sp>
+            <p:nvSpPr>
+              <p:cNvPr id="19" name="TextBox 18">
+                <a:extLst>
+                  <a:ext uri="{FF2B5EF4-FFF2-40B4-BE49-F238E27FC236}">
+                    <a16:creationId xmlns:a16="http://schemas.microsoft.com/office/drawing/2014/main" id="{DBF3EBCA-DEA5-804C-5ACF-EAD5E883E1CF}"/>
+                  </a:ext>
+                </a:extLst>
+              </p:cNvPr>
+              <p:cNvSpPr txBox="1"/>
+              <p:nvPr/>
+            </p:nvSpPr>
+            <p:spPr>
+              <a:xfrm>
+                <a:off x="2891790" y="2004317"/>
+                <a:ext cx="2060575" cy="128007"/>
+              </a:xfrm>
+              <a:prstGeom prst="rect">
+                <a:avLst/>
+              </a:prstGeom>
+              <a:noFill/>
+            </p:spPr>
+            <p:txBody>
+              <a:bodyPr wrap="square" lIns="0" tIns="0" rIns="0" bIns="0" rtlCol="0">
+                <a:spAutoFit/>
+              </a:bodyPr>
+              <a:lstStyle/>
+              <a:p>
+                <a:pPr algn="l"/>
+                <a:r>
+                  <a:rPr lang="en-US" sz="1200" dirty="0"/>
+                  <a:t>Order, customer info</a:t>
+                </a:r>
+              </a:p>
+            </p:txBody>
+          </p:sp>
+        </p:grpSp>
+        <p:grpSp>
+          <p:nvGrpSpPr>
+            <p:cNvPr id="20" name="Group 19">
+              <a:extLst>
+                <a:ext uri="{FF2B5EF4-FFF2-40B4-BE49-F238E27FC236}">
+                  <a16:creationId xmlns:a16="http://schemas.microsoft.com/office/drawing/2014/main" id="{2DF67893-32E6-DDE9-F107-1553CB31AE67}"/>
+                </a:ext>
+              </a:extLst>
+            </p:cNvPr>
+            <p:cNvGrpSpPr/>
+            <p:nvPr/>
+          </p:nvGrpSpPr>
+          <p:grpSpPr>
+            <a:xfrm>
+              <a:off x="3276600" y="1777356"/>
+              <a:ext cx="2112010" cy="137289"/>
+              <a:chOff x="3215005" y="1996311"/>
+              <a:chExt cx="2112010" cy="137289"/>
+            </a:xfrm>
+          </p:grpSpPr>
+          <p:cxnSp>
+            <p:nvCxnSpPr>
+              <p:cNvPr id="21" name="Straight Arrow Connector 20">
+                <a:extLst>
+                  <a:ext uri="{FF2B5EF4-FFF2-40B4-BE49-F238E27FC236}">
+                    <a16:creationId xmlns:a16="http://schemas.microsoft.com/office/drawing/2014/main" id="{05CA558D-6443-749C-FDD5-8A7BF201508A}"/>
+                  </a:ext>
+                </a:extLst>
+              </p:cNvPr>
+              <p:cNvCxnSpPr>
+                <a:cxnSpLocks/>
+              </p:cNvCxnSpPr>
+              <p:nvPr/>
+            </p:nvCxnSpPr>
+            <p:spPr>
+              <a:xfrm flipH="1">
+                <a:off x="3215005" y="2133600"/>
+                <a:ext cx="2031365" cy="0"/>
+              </a:xfrm>
+              <a:prstGeom prst="straightConnector1">
+                <a:avLst/>
+              </a:prstGeom>
+              <a:ln w="28575">
+                <a:solidFill>
+                  <a:schemeClr val="tx1"/>
+                </a:solidFill>
+                <a:tailEnd type="triangle"/>
+              </a:ln>
+            </p:spPr>
+            <p:style>
+              <a:lnRef idx="1">
+                <a:schemeClr val="accent1"/>
+              </a:lnRef>
+              <a:fillRef idx="0">
+                <a:schemeClr val="accent1"/>
+              </a:fillRef>
+              <a:effectRef idx="0">
+                <a:schemeClr val="accent1"/>
+              </a:effectRef>
+              <a:fontRef idx="minor">
+                <a:schemeClr val="tx1"/>
+              </a:fontRef>
+            </p:style>
+          </p:cxnSp>
+          <p:sp>
+            <p:nvSpPr>
+              <p:cNvPr id="22" name="TextBox 21">
+                <a:extLst>
+                  <a:ext uri="{FF2B5EF4-FFF2-40B4-BE49-F238E27FC236}">
+                    <a16:creationId xmlns:a16="http://schemas.microsoft.com/office/drawing/2014/main" id="{7C3E45A7-2BC8-983D-9AB3-4FA0CA17CD7F}"/>
+                  </a:ext>
+                </a:extLst>
+              </p:cNvPr>
+              <p:cNvSpPr txBox="1"/>
+              <p:nvPr/>
+            </p:nvSpPr>
+            <p:spPr>
+              <a:xfrm>
+                <a:off x="3673475" y="1996311"/>
+                <a:ext cx="1653540" cy="128007"/>
+              </a:xfrm>
+              <a:prstGeom prst="rect">
+                <a:avLst/>
+              </a:prstGeom>
+              <a:noFill/>
+            </p:spPr>
+            <p:txBody>
+              <a:bodyPr wrap="square" lIns="0" tIns="0" rIns="0" bIns="0" rtlCol="0">
+                <a:spAutoFit/>
+              </a:bodyPr>
+              <a:lstStyle/>
+              <a:p>
+                <a:pPr algn="l"/>
+                <a:r>
+                  <a:rPr lang="en-US" sz="1200" dirty="0"/>
+                  <a:t>Book info, Order status</a:t>
+                </a:r>
+              </a:p>
+            </p:txBody>
+          </p:sp>
+        </p:grpSp>
+        <p:grpSp>
+          <p:nvGrpSpPr>
+            <p:cNvPr id="24" name="Group 23">
+              <a:extLst>
+                <a:ext uri="{FF2B5EF4-FFF2-40B4-BE49-F238E27FC236}">
+                  <a16:creationId xmlns:a16="http://schemas.microsoft.com/office/drawing/2014/main" id="{D105238F-0DED-37AD-DF3E-5D6DF2997D6D}"/>
+                </a:ext>
+              </a:extLst>
+            </p:cNvPr>
+            <p:cNvGrpSpPr/>
+            <p:nvPr/>
+          </p:nvGrpSpPr>
+          <p:grpSpPr>
+            <a:xfrm>
+              <a:off x="6473825" y="1778913"/>
+              <a:ext cx="2093277" cy="135732"/>
+              <a:chOff x="2732405" y="2017511"/>
+              <a:chExt cx="2093277" cy="135732"/>
+            </a:xfrm>
+          </p:grpSpPr>
+          <p:cxnSp>
+            <p:nvCxnSpPr>
+              <p:cNvPr id="25" name="Straight Arrow Connector 24">
+                <a:extLst>
+                  <a:ext uri="{FF2B5EF4-FFF2-40B4-BE49-F238E27FC236}">
+                    <a16:creationId xmlns:a16="http://schemas.microsoft.com/office/drawing/2014/main" id="{1467C09C-F21A-8670-7864-A1BF49B6F90D}"/>
+                  </a:ext>
+                </a:extLst>
+              </p:cNvPr>
+              <p:cNvCxnSpPr>
+                <a:cxnSpLocks/>
+              </p:cNvCxnSpPr>
+              <p:nvPr/>
+            </p:nvCxnSpPr>
+            <p:spPr>
+              <a:xfrm flipH="1" flipV="1">
+                <a:off x="2732405" y="2143961"/>
+                <a:ext cx="2060575" cy="9282"/>
+              </a:xfrm>
+              <a:prstGeom prst="straightConnector1">
+                <a:avLst/>
+              </a:prstGeom>
+              <a:ln w="28575">
+                <a:solidFill>
+                  <a:schemeClr val="tx1"/>
+                </a:solidFill>
+                <a:tailEnd type="triangle"/>
+              </a:ln>
+            </p:spPr>
+            <p:style>
+              <a:lnRef idx="1">
+                <a:schemeClr val="accent1"/>
+              </a:lnRef>
+              <a:fillRef idx="0">
+                <a:schemeClr val="accent1"/>
+              </a:fillRef>
+              <a:effectRef idx="0">
+                <a:schemeClr val="accent1"/>
+              </a:effectRef>
+              <a:fontRef idx="minor">
+                <a:schemeClr val="tx1"/>
+              </a:fontRef>
+            </p:style>
+          </p:cxnSp>
+          <p:sp>
+            <p:nvSpPr>
+              <p:cNvPr id="26" name="TextBox 25">
+                <a:extLst>
+                  <a:ext uri="{FF2B5EF4-FFF2-40B4-BE49-F238E27FC236}">
+                    <a16:creationId xmlns:a16="http://schemas.microsoft.com/office/drawing/2014/main" id="{10C59DBE-B5EC-DA5F-13C5-C42090FC2168}"/>
+                  </a:ext>
+                </a:extLst>
+              </p:cNvPr>
+              <p:cNvSpPr txBox="1"/>
+              <p:nvPr/>
+            </p:nvSpPr>
+            <p:spPr>
+              <a:xfrm>
+                <a:off x="3819842" y="2017511"/>
+                <a:ext cx="1005840" cy="128007"/>
+              </a:xfrm>
+              <a:prstGeom prst="rect">
+                <a:avLst/>
+              </a:prstGeom>
+              <a:noFill/>
+            </p:spPr>
+            <p:txBody>
+              <a:bodyPr wrap="square" lIns="0" tIns="0" rIns="0" bIns="0" rtlCol="0">
+                <a:spAutoFit/>
+              </a:bodyPr>
+              <a:lstStyle/>
+              <a:p>
+                <a:pPr algn="l"/>
+                <a:r>
+                  <a:rPr lang="en-US" sz="1200" dirty="0"/>
+                  <a:t>Order status</a:t>
+                </a:r>
+              </a:p>
+            </p:txBody>
+          </p:sp>
+        </p:grpSp>
+      </p:grpSp>
+    </p:spTree>
+    <p:extLst>
+      <p:ext uri="{BB962C8B-B14F-4D97-AF65-F5344CB8AC3E}">
+        <p14:creationId xmlns:p14="http://schemas.microsoft.com/office/powerpoint/2010/main" val="2518300287"/>
+      </p:ext>
+    </p:extLst>
+  </p:cSld>
+  <p:clrMapOvr>
+    <a:masterClrMapping/>
+  </p:clrMapOvr>
+  <mc:AlternateContent xmlns:mc="http://schemas.openxmlformats.org/markup-compatibility/2006" xmlns:p14="http://schemas.microsoft.com/office/powerpoint/2010/main">
+    <mc:Choice Requires="p14">
+      <p:transition spd="med" p14:dur="700">
+        <p:fade/>
+      </p:transition>
+    </mc:Choice>
+    <mc:Fallback xmlns="">
+      <p:transition spd="med">
+        <p:fade/>
+      </p:transition>
+    </mc:Fallback>
+  </mc:AlternateContent>
 </p:sld>
 </file>
 

</xml_diff>